<commit_message>
update of pca-phers script
</commit_message>
<xml_diff>
--- a/docs/flowcharts.pptx
+++ b/docs/flowcharts.pptx
@@ -260,7 +260,7 @@
           <a:p>
             <a:fld id="{56A52284-4F88-684B-B211-7D10E157D84B}" type="datetimeFigureOut">
               <a:rPr lang="en-US" smtClean="0"/>
-              <a:t>3/10/23</a:t>
+              <a:t>3/15/23</a:t>
             </a:fld>
             <a:endParaRPr lang="en-US"/>
           </a:p>
@@ -458,7 +458,7 @@
           <a:p>
             <a:fld id="{56A52284-4F88-684B-B211-7D10E157D84B}" type="datetimeFigureOut">
               <a:rPr lang="en-US" smtClean="0"/>
-              <a:t>3/10/23</a:t>
+              <a:t>3/15/23</a:t>
             </a:fld>
             <a:endParaRPr lang="en-US"/>
           </a:p>
@@ -666,7 +666,7 @@
           <a:p>
             <a:fld id="{56A52284-4F88-684B-B211-7D10E157D84B}" type="datetimeFigureOut">
               <a:rPr lang="en-US" smtClean="0"/>
-              <a:t>3/10/23</a:t>
+              <a:t>3/15/23</a:t>
             </a:fld>
             <a:endParaRPr lang="en-US"/>
           </a:p>
@@ -864,7 +864,7 @@
           <a:p>
             <a:fld id="{56A52284-4F88-684B-B211-7D10E157D84B}" type="datetimeFigureOut">
               <a:rPr lang="en-US" smtClean="0"/>
-              <a:t>3/10/23</a:t>
+              <a:t>3/15/23</a:t>
             </a:fld>
             <a:endParaRPr lang="en-US"/>
           </a:p>
@@ -1139,7 +1139,7 @@
           <a:p>
             <a:fld id="{56A52284-4F88-684B-B211-7D10E157D84B}" type="datetimeFigureOut">
               <a:rPr lang="en-US" smtClean="0"/>
-              <a:t>3/10/23</a:t>
+              <a:t>3/15/23</a:t>
             </a:fld>
             <a:endParaRPr lang="en-US"/>
           </a:p>
@@ -1404,7 +1404,7 @@
           <a:p>
             <a:fld id="{56A52284-4F88-684B-B211-7D10E157D84B}" type="datetimeFigureOut">
               <a:rPr lang="en-US" smtClean="0"/>
-              <a:t>3/10/23</a:t>
+              <a:t>3/15/23</a:t>
             </a:fld>
             <a:endParaRPr lang="en-US"/>
           </a:p>
@@ -1816,7 +1816,7 @@
           <a:p>
             <a:fld id="{56A52284-4F88-684B-B211-7D10E157D84B}" type="datetimeFigureOut">
               <a:rPr lang="en-US" smtClean="0"/>
-              <a:t>3/10/23</a:t>
+              <a:t>3/15/23</a:t>
             </a:fld>
             <a:endParaRPr lang="en-US"/>
           </a:p>
@@ -1957,7 +1957,7 @@
           <a:p>
             <a:fld id="{56A52284-4F88-684B-B211-7D10E157D84B}" type="datetimeFigureOut">
               <a:rPr lang="en-US" smtClean="0"/>
-              <a:t>3/10/23</a:t>
+              <a:t>3/15/23</a:t>
             </a:fld>
             <a:endParaRPr lang="en-US"/>
           </a:p>
@@ -2070,7 +2070,7 @@
           <a:p>
             <a:fld id="{56A52284-4F88-684B-B211-7D10E157D84B}" type="datetimeFigureOut">
               <a:rPr lang="en-US" smtClean="0"/>
-              <a:t>3/10/23</a:t>
+              <a:t>3/15/23</a:t>
             </a:fld>
             <a:endParaRPr lang="en-US"/>
           </a:p>
@@ -2381,7 +2381,7 @@
           <a:p>
             <a:fld id="{56A52284-4F88-684B-B211-7D10E157D84B}" type="datetimeFigureOut">
               <a:rPr lang="en-US" smtClean="0"/>
-              <a:t>3/10/23</a:t>
+              <a:t>3/15/23</a:t>
             </a:fld>
             <a:endParaRPr lang="en-US"/>
           </a:p>
@@ -2672,7 +2672,7 @@
           <a:p>
             <a:fld id="{56A52284-4F88-684B-B211-7D10E157D84B}" type="datetimeFigureOut">
               <a:rPr lang="en-US" smtClean="0"/>
-              <a:t>3/10/23</a:t>
+              <a:t>3/15/23</a:t>
             </a:fld>
             <a:endParaRPr lang="en-US"/>
           </a:p>
@@ -2915,7 +2915,7 @@
             <a:fld id="{56A52284-4F88-684B-B211-7D10E157D84B}" type="datetimeFigureOut">
               <a:rPr lang="en-US" smtClean="0"/>
               <a:pPr/>
-              <a:t>3/10/23</a:t>
+              <a:t>3/15/23</a:t>
             </a:fld>
             <a:endParaRPr lang="en-US"/>
           </a:p>
@@ -4479,20 +4479,16 @@
         <p:spPr>
           <a:xfrm>
             <a:off x="1184833" y="2266674"/>
-            <a:ext cx="2651233" cy="995222"/>
+            <a:ext cx="2651233" cy="996696"/>
           </a:xfrm>
           <a:prstGeom prst="rect">
             <a:avLst/>
           </a:prstGeom>
           <a:solidFill>
-            <a:schemeClr val="accent2">
-              <a:alpha val="80000"/>
-            </a:schemeClr>
+            <a:schemeClr val="accent2"/>
           </a:solidFill>
           <a:ln w="31750">
-            <a:solidFill>
-              <a:schemeClr val="accent2"/>
-            </a:solidFill>
+            <a:noFill/>
             <a:prstDash val="dash"/>
           </a:ln>
         </p:spPr>
@@ -4518,7 +4514,7 @@
           <a:p>
             <a:pPr algn="ctr"/>
             <a:r>
-              <a:rPr lang="en-US" sz="1200" dirty="0">
+              <a:rPr lang="en-US" sz="1200" u="sng" dirty="0">
                 <a:latin typeface="Fira Code" panose="020B0809050000020004" pitchFamily="49" charset="0"/>
                 <a:ea typeface="Fira Code" panose="020B0809050000020004" pitchFamily="49" charset="0"/>
               </a:rPr>
@@ -4553,6 +4549,69 @@
                 <a:ea typeface="Fira Code" panose="020B0809050000020004" pitchFamily="49" charset="0"/>
               </a:rPr>
               <a:t>02_group_lasso.R</a:t>
+            </a:r>
+          </a:p>
+        </p:txBody>
+      </p:sp>
+      <p:sp>
+        <p:nvSpPr>
+          <p:cNvPr id="3" name="Rectangle 2">
+            <a:extLst>
+              <a:ext uri="{FF2B5EF4-FFF2-40B4-BE49-F238E27FC236}">
+                <a16:creationId xmlns:a16="http://schemas.microsoft.com/office/drawing/2014/main" id="{2455477E-1C45-ADD6-86FF-8579ADD57069}"/>
+              </a:ext>
+            </a:extLst>
+          </p:cNvPr>
+          <p:cNvSpPr/>
+          <p:nvPr/>
+        </p:nvSpPr>
+        <p:spPr>
+          <a:xfrm>
+            <a:off x="7270577" y="3330126"/>
+            <a:ext cx="3422524" cy="441434"/>
+          </a:xfrm>
+          <a:prstGeom prst="rect">
+            <a:avLst/>
+          </a:prstGeom>
+          <a:solidFill>
+            <a:schemeClr val="accent3">
+              <a:alpha val="80000"/>
+            </a:schemeClr>
+          </a:solidFill>
+          <a:ln w="38100">
+            <a:solidFill>
+              <a:schemeClr val="accent3"/>
+            </a:solidFill>
+            <a:prstDash val="dash"/>
+          </a:ln>
+        </p:spPr>
+        <p:style>
+          <a:lnRef idx="2">
+            <a:schemeClr val="accent1">
+              <a:shade val="50000"/>
+            </a:schemeClr>
+          </a:lnRef>
+          <a:fillRef idx="1">
+            <a:schemeClr val="accent1"/>
+          </a:fillRef>
+          <a:effectRef idx="0">
+            <a:schemeClr val="accent1"/>
+          </a:effectRef>
+          <a:fontRef idx="minor">
+            <a:schemeClr val="lt1"/>
+          </a:fontRef>
+        </p:style>
+        <p:txBody>
+          <a:bodyPr rtlCol="0" anchor="ctr"/>
+          <a:lstStyle/>
+          <a:p>
+            <a:pPr algn="ctr"/>
+            <a:r>
+              <a:rPr lang="en-US" sz="1200" dirty="0">
+                <a:latin typeface="Fira Code" panose="020B0809050000020004" pitchFamily="49" charset="0"/>
+                <a:ea typeface="Fira Code" panose="020B0809050000020004" pitchFamily="49" charset="0"/>
+              </a:rPr>
+              <a:t>03_calculate_multivariable_phers.R</a:t>
             </a:r>
           </a:p>
         </p:txBody>
@@ -5671,14 +5730,14 @@
           </p:cNvPr>
           <p:cNvCxnSpPr>
             <a:cxnSpLocks/>
-            <a:endCxn id="20" idx="0"/>
+            <a:endCxn id="48" idx="0"/>
           </p:cNvCxnSpPr>
           <p:nvPr/>
         </p:nvCxnSpPr>
         <p:spPr>
           <a:xfrm>
             <a:off x="9201674" y="4012250"/>
-            <a:ext cx="1148068" cy="214071"/>
+            <a:ext cx="588435" cy="671054"/>
           </a:xfrm>
           <a:prstGeom prst="straightConnector1">
             <a:avLst/>
@@ -6013,7 +6072,15 @@
             <a:pPr algn="ctr"/>
             <a:r>
               <a:rPr lang="en-US" sz="1200" dirty="0"/>
-              <a:t>Weighted logistic regression of selected and filtered </a:t>
+              <a:t>Weighted RIDGE regression of </a:t>
+            </a:r>
+            <a:r>
+              <a:rPr lang="en-US" sz="1200" b="1" i="1" dirty="0"/>
+              <a:t>selected</a:t>
+            </a:r>
+            <a:r>
+              <a:rPr lang="en-US" sz="1200" dirty="0"/>
+              <a:t> </a:t>
             </a:r>
             <a:r>
               <a:rPr lang="en-US" sz="1200" dirty="0" err="1"/>
@@ -8150,6 +8217,153 @@
           </a:p>
         </p:txBody>
       </p:sp>
+      <p:sp>
+        <p:nvSpPr>
+          <p:cNvPr id="12" name="TextBox 11">
+            <a:extLst>
+              <a:ext uri="{FF2B5EF4-FFF2-40B4-BE49-F238E27FC236}">
+                <a16:creationId xmlns:a16="http://schemas.microsoft.com/office/drawing/2014/main" id="{0E2DB5C9-3C60-96B0-F11A-3B171D38F20E}"/>
+              </a:ext>
+            </a:extLst>
+          </p:cNvPr>
+          <p:cNvSpPr txBox="1"/>
+          <p:nvPr/>
+        </p:nvSpPr>
+        <p:spPr>
+          <a:xfrm>
+            <a:off x="8921975" y="4113356"/>
+            <a:ext cx="646331" cy="646331"/>
+          </a:xfrm>
+          <a:prstGeom prst="rect">
+            <a:avLst/>
+          </a:prstGeom>
+          <a:noFill/>
+        </p:spPr>
+        <p:txBody>
+          <a:bodyPr wrap="none" rtlCol="0" anchor="ctr">
+            <a:spAutoFit/>
+          </a:bodyPr>
+          <a:lstStyle/>
+          <a:p>
+            <a:pPr algn="ctr"/>
+            <a:r>
+              <a:rPr lang="en-US" sz="3600" dirty="0"/>
+              <a:t>✔️</a:t>
+            </a:r>
+          </a:p>
+        </p:txBody>
+      </p:sp>
+      <p:sp>
+        <p:nvSpPr>
+          <p:cNvPr id="13" name="Rectangle 12">
+            <a:extLst>
+              <a:ext uri="{FF2B5EF4-FFF2-40B4-BE49-F238E27FC236}">
+                <a16:creationId xmlns:a16="http://schemas.microsoft.com/office/drawing/2014/main" id="{83BFBAE7-7193-0878-C0BF-66A59B05AB70}"/>
+              </a:ext>
+            </a:extLst>
+          </p:cNvPr>
+          <p:cNvSpPr/>
+          <p:nvPr/>
+        </p:nvSpPr>
+        <p:spPr>
+          <a:xfrm>
+            <a:off x="57544" y="3420238"/>
+            <a:ext cx="3775449" cy="646331"/>
+          </a:xfrm>
+          <a:prstGeom prst="rect">
+            <a:avLst/>
+          </a:prstGeom>
+          <a:solidFill>
+            <a:schemeClr val="accent2"/>
+          </a:solidFill>
+          <a:ln>
+            <a:noFill/>
+          </a:ln>
+          <a:effectLst>
+            <a:outerShdw blurRad="50800" dist="38100" dir="2700000" algn="tl" rotWithShape="0">
+              <a:prstClr val="black">
+                <a:alpha val="40000"/>
+              </a:prstClr>
+            </a:outerShdw>
+          </a:effectLst>
+        </p:spPr>
+        <p:style>
+          <a:lnRef idx="2">
+            <a:schemeClr val="accent1">
+              <a:shade val="50000"/>
+            </a:schemeClr>
+          </a:lnRef>
+          <a:fillRef idx="1">
+            <a:schemeClr val="accent1"/>
+          </a:fillRef>
+          <a:effectRef idx="0">
+            <a:schemeClr val="accent1"/>
+          </a:effectRef>
+          <a:fontRef idx="minor">
+            <a:schemeClr val="lt1"/>
+          </a:fontRef>
+        </p:style>
+        <p:txBody>
+          <a:bodyPr rtlCol="0" anchor="ctr"/>
+          <a:lstStyle/>
+          <a:p>
+            <a:pPr algn="ctr"/>
+            <a:r>
+              <a:rPr lang="en-US" sz="1400" dirty="0">
+                <a:latin typeface="Andale Mono" panose="020B0509000000000004" pitchFamily="49" charset="0"/>
+              </a:rPr>
+              <a:t>Add PCA approach</a:t>
+            </a:r>
+          </a:p>
+        </p:txBody>
+      </p:sp>
+      <p:cxnSp>
+        <p:nvCxnSpPr>
+          <p:cNvPr id="18" name="Elbow Connector 17">
+            <a:extLst>
+              <a:ext uri="{FF2B5EF4-FFF2-40B4-BE49-F238E27FC236}">
+                <a16:creationId xmlns:a16="http://schemas.microsoft.com/office/drawing/2014/main" id="{F994C1A3-B6E0-1D5C-B03A-DEEA1CB87D7A}"/>
+              </a:ext>
+            </a:extLst>
+          </p:cNvPr>
+          <p:cNvCxnSpPr>
+            <a:endCxn id="50" idx="3"/>
+          </p:cNvCxnSpPr>
+          <p:nvPr/>
+        </p:nvCxnSpPr>
+        <p:spPr>
+          <a:xfrm rot="16200000" flipH="1">
+            <a:off x="10261886" y="4036508"/>
+            <a:ext cx="2303004" cy="199083"/>
+          </a:xfrm>
+          <a:prstGeom prst="bentConnector4">
+            <a:avLst>
+              <a:gd name="adj1" fmla="val 446"/>
+              <a:gd name="adj2" fmla="val 214826"/>
+            </a:avLst>
+          </a:prstGeom>
+          <a:ln w="38100">
+            <a:solidFill>
+              <a:schemeClr val="accent6"/>
+            </a:solidFill>
+            <a:tailEnd type="triangle"/>
+          </a:ln>
+        </p:spPr>
+        <p:style>
+          <a:lnRef idx="1">
+            <a:schemeClr val="accent1"/>
+          </a:lnRef>
+          <a:fillRef idx="0">
+            <a:schemeClr val="accent1"/>
+          </a:fillRef>
+          <a:effectRef idx="0">
+            <a:schemeClr val="accent1"/>
+          </a:effectRef>
+          <a:fontRef idx="minor">
+            <a:schemeClr val="tx1"/>
+          </a:fontRef>
+        </p:style>
+      </p:cxnSp>
     </p:spTree>
     <p:extLst>
       <p:ext uri="{BB962C8B-B14F-4D97-AF65-F5344CB8AC3E}">

</xml_diff>

<commit_message>
sync updates based on aou
</commit_message>
<xml_diff>
--- a/docs/flowcharts.pptx
+++ b/docs/flowcharts.pptx
@@ -7,6 +7,7 @@
   <p:sldIdLst>
     <p:sldId id="256" r:id="rId2"/>
     <p:sldId id="257" r:id="rId3"/>
+    <p:sldId id="258" r:id="rId4"/>
   </p:sldIdLst>
   <p:sldSz cx="12192000" cy="6858000"/>
   <p:notesSz cx="6858000" cy="9144000"/>
@@ -260,7 +261,7 @@
           <a:p>
             <a:fld id="{56A52284-4F88-684B-B211-7D10E157D84B}" type="datetimeFigureOut">
               <a:rPr lang="en-US" smtClean="0"/>
-              <a:t>3/15/23</a:t>
+              <a:t>3/17/23</a:t>
             </a:fld>
             <a:endParaRPr lang="en-US"/>
           </a:p>
@@ -458,7 +459,7 @@
           <a:p>
             <a:fld id="{56A52284-4F88-684B-B211-7D10E157D84B}" type="datetimeFigureOut">
               <a:rPr lang="en-US" smtClean="0"/>
-              <a:t>3/15/23</a:t>
+              <a:t>3/17/23</a:t>
             </a:fld>
             <a:endParaRPr lang="en-US"/>
           </a:p>
@@ -666,7 +667,7 @@
           <a:p>
             <a:fld id="{56A52284-4F88-684B-B211-7D10E157D84B}" type="datetimeFigureOut">
               <a:rPr lang="en-US" smtClean="0"/>
-              <a:t>3/15/23</a:t>
+              <a:t>3/17/23</a:t>
             </a:fld>
             <a:endParaRPr lang="en-US"/>
           </a:p>
@@ -864,7 +865,7 @@
           <a:p>
             <a:fld id="{56A52284-4F88-684B-B211-7D10E157D84B}" type="datetimeFigureOut">
               <a:rPr lang="en-US" smtClean="0"/>
-              <a:t>3/15/23</a:t>
+              <a:t>3/17/23</a:t>
             </a:fld>
             <a:endParaRPr lang="en-US"/>
           </a:p>
@@ -1139,7 +1140,7 @@
           <a:p>
             <a:fld id="{56A52284-4F88-684B-B211-7D10E157D84B}" type="datetimeFigureOut">
               <a:rPr lang="en-US" smtClean="0"/>
-              <a:t>3/15/23</a:t>
+              <a:t>3/17/23</a:t>
             </a:fld>
             <a:endParaRPr lang="en-US"/>
           </a:p>
@@ -1404,7 +1405,7 @@
           <a:p>
             <a:fld id="{56A52284-4F88-684B-B211-7D10E157D84B}" type="datetimeFigureOut">
               <a:rPr lang="en-US" smtClean="0"/>
-              <a:t>3/15/23</a:t>
+              <a:t>3/17/23</a:t>
             </a:fld>
             <a:endParaRPr lang="en-US"/>
           </a:p>
@@ -1816,7 +1817,7 @@
           <a:p>
             <a:fld id="{56A52284-4F88-684B-B211-7D10E157D84B}" type="datetimeFigureOut">
               <a:rPr lang="en-US" smtClean="0"/>
-              <a:t>3/15/23</a:t>
+              <a:t>3/17/23</a:t>
             </a:fld>
             <a:endParaRPr lang="en-US"/>
           </a:p>
@@ -1957,7 +1958,7 @@
           <a:p>
             <a:fld id="{56A52284-4F88-684B-B211-7D10E157D84B}" type="datetimeFigureOut">
               <a:rPr lang="en-US" smtClean="0"/>
-              <a:t>3/15/23</a:t>
+              <a:t>3/17/23</a:t>
             </a:fld>
             <a:endParaRPr lang="en-US"/>
           </a:p>
@@ -2070,7 +2071,7 @@
           <a:p>
             <a:fld id="{56A52284-4F88-684B-B211-7D10E157D84B}" type="datetimeFigureOut">
               <a:rPr lang="en-US" smtClean="0"/>
-              <a:t>3/15/23</a:t>
+              <a:t>3/17/23</a:t>
             </a:fld>
             <a:endParaRPr lang="en-US"/>
           </a:p>
@@ -2381,7 +2382,7 @@
           <a:p>
             <a:fld id="{56A52284-4F88-684B-B211-7D10E157D84B}" type="datetimeFigureOut">
               <a:rPr lang="en-US" smtClean="0"/>
-              <a:t>3/15/23</a:t>
+              <a:t>3/17/23</a:t>
             </a:fld>
             <a:endParaRPr lang="en-US"/>
           </a:p>
@@ -2672,7 +2673,7 @@
           <a:p>
             <a:fld id="{56A52284-4F88-684B-B211-7D10E157D84B}" type="datetimeFigureOut">
               <a:rPr lang="en-US" smtClean="0"/>
-              <a:t>3/15/23</a:t>
+              <a:t>3/17/23</a:t>
             </a:fld>
             <a:endParaRPr lang="en-US"/>
           </a:p>
@@ -2915,7 +2916,7 @@
             <a:fld id="{56A52284-4F88-684B-B211-7D10E157D84B}" type="datetimeFigureOut">
               <a:rPr lang="en-US" smtClean="0"/>
               <a:pPr/>
-              <a:t>3/15/23</a:t>
+              <a:t>3/17/23</a:t>
             </a:fld>
             <a:endParaRPr lang="en-US"/>
           </a:p>
@@ -8377,6 +8378,99 @@
 </p:sld>
 </file>
 
+<file path=ppt/slides/slide3.xml><?xml version="1.0" encoding="utf-8"?>
+<p:sld xmlns:a="http://schemas.openxmlformats.org/drawingml/2006/main" xmlns:r="http://schemas.openxmlformats.org/officeDocument/2006/relationships" xmlns:p="http://schemas.openxmlformats.org/presentationml/2006/main">
+  <p:cSld>
+    <p:spTree>
+      <p:nvGrpSpPr>
+        <p:cNvPr id="1" name=""/>
+        <p:cNvGrpSpPr/>
+        <p:nvPr/>
+      </p:nvGrpSpPr>
+      <p:grpSpPr>
+        <a:xfrm>
+          <a:off x="0" y="0"/>
+          <a:ext cx="0" cy="0"/>
+          <a:chOff x="0" y="0"/>
+          <a:chExt cx="0" cy="0"/>
+        </a:xfrm>
+      </p:grpSpPr>
+      <p:sp>
+        <p:nvSpPr>
+          <p:cNvPr id="2" name="Rectangle 1">
+            <a:extLst>
+              <a:ext uri="{FF2B5EF4-FFF2-40B4-BE49-F238E27FC236}">
+                <a16:creationId xmlns:a16="http://schemas.microsoft.com/office/drawing/2014/main" id="{E6DAF69D-5969-0619-58DD-489AD8F3C165}"/>
+              </a:ext>
+            </a:extLst>
+          </p:cNvPr>
+          <p:cNvSpPr/>
+          <p:nvPr/>
+        </p:nvSpPr>
+        <p:spPr>
+          <a:xfrm>
+            <a:off x="656217" y="1484555"/>
+            <a:ext cx="2872291" cy="1140311"/>
+          </a:xfrm>
+          <a:prstGeom prst="rect">
+            <a:avLst/>
+          </a:prstGeom>
+          <a:ln>
+            <a:noFill/>
+          </a:ln>
+        </p:spPr>
+        <p:style>
+          <a:lnRef idx="2">
+            <a:schemeClr val="accent1">
+              <a:shade val="50000"/>
+            </a:schemeClr>
+          </a:lnRef>
+          <a:fillRef idx="1">
+            <a:schemeClr val="accent1"/>
+          </a:fillRef>
+          <a:effectRef idx="0">
+            <a:schemeClr val="accent1"/>
+          </a:effectRef>
+          <a:fontRef idx="minor">
+            <a:schemeClr val="lt1"/>
+          </a:fontRef>
+        </p:style>
+        <p:txBody>
+          <a:bodyPr rtlCol="0" anchor="ctr"/>
+          <a:lstStyle/>
+          <a:p>
+            <a:pPr algn="ctr"/>
+            <a:r>
+              <a:rPr lang="en-US" dirty="0">
+                <a:latin typeface="Lato" panose="020F0502020204030203" pitchFamily="34" charset="77"/>
+              </a:rPr>
+              <a:t>All of Us Conditions v6</a:t>
+            </a:r>
+          </a:p>
+          <a:p>
+            <a:pPr algn="ctr"/>
+            <a:r>
+              <a:rPr lang="en-US" dirty="0">
+                <a:latin typeface="Lato" panose="020F0502020204030203" pitchFamily="34" charset="77"/>
+              </a:rPr>
+              <a:t>N = 223,158</a:t>
+            </a:r>
+          </a:p>
+        </p:txBody>
+      </p:sp>
+    </p:spTree>
+    <p:extLst>
+      <p:ext uri="{BB962C8B-B14F-4D97-AF65-F5344CB8AC3E}">
+        <p14:creationId xmlns:p14="http://schemas.microsoft.com/office/powerpoint/2010/main" val="1811681815"/>
+      </p:ext>
+    </p:extLst>
+  </p:cSld>
+  <p:clrMapOvr>
+    <a:masterClrMapping/>
+  </p:clrMapOvr>
+</p:sld>
+</file>
+
 <file path=ppt/theme/theme1.xml><?xml version="1.0" encoding="utf-8"?>
 <a:theme xmlns:a="http://schemas.openxmlformats.org/drawingml/2006/main" name="Office Theme">
   <a:themeElements>

</xml_diff>